<commit_message>
added chart to summary
</commit_message>
<xml_diff>
--- a/DATA604_Final/DATA604_Final_Presentation.pptx
+++ b/DATA604_Final/DATA604_Final_Presentation.pptx
@@ -950,7 +950,7 @@
     </p:spTree>
     <p:extLst>
       <p:ext uri="{BB962C8B-B14F-4D97-AF65-F5344CB8AC3E}">
-        <p14:creationId xmlns="" xmlns:p14="http://schemas.microsoft.com/office/powerpoint/2010/main" val="209635610"/>
+        <p14:creationId xmlns:p14="http://schemas.microsoft.com/office/powerpoint/2010/main" xmlns="" val="209635610"/>
       </p:ext>
     </p:extLst>
   </p:cSld>
@@ -1122,7 +1122,7 @@
     </p:spTree>
     <p:extLst>
       <p:ext uri="{BB962C8B-B14F-4D97-AF65-F5344CB8AC3E}">
-        <p14:creationId xmlns="" xmlns:p14="http://schemas.microsoft.com/office/powerpoint/2010/main" val="3418171736"/>
+        <p14:creationId xmlns:p14="http://schemas.microsoft.com/office/powerpoint/2010/main" xmlns="" val="3418171736"/>
       </p:ext>
     </p:extLst>
   </p:cSld>
@@ -1304,7 +1304,7 @@
     </p:spTree>
     <p:extLst>
       <p:ext uri="{BB962C8B-B14F-4D97-AF65-F5344CB8AC3E}">
-        <p14:creationId xmlns="" xmlns:p14="http://schemas.microsoft.com/office/powerpoint/2010/main" val="867631473"/>
+        <p14:creationId xmlns:p14="http://schemas.microsoft.com/office/powerpoint/2010/main" xmlns="" val="867631473"/>
       </p:ext>
     </p:extLst>
   </p:cSld>
@@ -1476,7 +1476,7 @@
     </p:spTree>
     <p:extLst>
       <p:ext uri="{BB962C8B-B14F-4D97-AF65-F5344CB8AC3E}">
-        <p14:creationId xmlns="" xmlns:p14="http://schemas.microsoft.com/office/powerpoint/2010/main" val="1948375686"/>
+        <p14:creationId xmlns:p14="http://schemas.microsoft.com/office/powerpoint/2010/main" xmlns="" val="1948375686"/>
       </p:ext>
     </p:extLst>
   </p:cSld>
@@ -1724,7 +1724,7 @@
     </p:spTree>
     <p:extLst>
       <p:ext uri="{BB962C8B-B14F-4D97-AF65-F5344CB8AC3E}">
-        <p14:creationId xmlns="" xmlns:p14="http://schemas.microsoft.com/office/powerpoint/2010/main" val="1903787647"/>
+        <p14:creationId xmlns:p14="http://schemas.microsoft.com/office/powerpoint/2010/main" xmlns="" val="1903787647"/>
       </p:ext>
     </p:extLst>
   </p:cSld>
@@ -2014,7 +2014,7 @@
     </p:spTree>
     <p:extLst>
       <p:ext uri="{BB962C8B-B14F-4D97-AF65-F5344CB8AC3E}">
-        <p14:creationId xmlns="" xmlns:p14="http://schemas.microsoft.com/office/powerpoint/2010/main" val="1035553531"/>
+        <p14:creationId xmlns:p14="http://schemas.microsoft.com/office/powerpoint/2010/main" xmlns="" val="1035553531"/>
       </p:ext>
     </p:extLst>
   </p:cSld>
@@ -2438,7 +2438,7 @@
     </p:spTree>
     <p:extLst>
       <p:ext uri="{BB962C8B-B14F-4D97-AF65-F5344CB8AC3E}">
-        <p14:creationId xmlns="" xmlns:p14="http://schemas.microsoft.com/office/powerpoint/2010/main" val="453774783"/>
+        <p14:creationId xmlns:p14="http://schemas.microsoft.com/office/powerpoint/2010/main" xmlns="" val="453774783"/>
       </p:ext>
     </p:extLst>
   </p:cSld>
@@ -2558,7 +2558,7 @@
     </p:spTree>
     <p:extLst>
       <p:ext uri="{BB962C8B-B14F-4D97-AF65-F5344CB8AC3E}">
-        <p14:creationId xmlns="" xmlns:p14="http://schemas.microsoft.com/office/powerpoint/2010/main" val="2001349477"/>
+        <p14:creationId xmlns:p14="http://schemas.microsoft.com/office/powerpoint/2010/main" xmlns="" val="2001349477"/>
       </p:ext>
     </p:extLst>
   </p:cSld>
@@ -2655,7 +2655,7 @@
     </p:spTree>
     <p:extLst>
       <p:ext uri="{BB962C8B-B14F-4D97-AF65-F5344CB8AC3E}">
-        <p14:creationId xmlns="" xmlns:p14="http://schemas.microsoft.com/office/powerpoint/2010/main" val="1820672657"/>
+        <p14:creationId xmlns:p14="http://schemas.microsoft.com/office/powerpoint/2010/main" xmlns="" val="1820672657"/>
       </p:ext>
     </p:extLst>
   </p:cSld>
@@ -2934,7 +2934,7 @@
     </p:spTree>
     <p:extLst>
       <p:ext uri="{BB962C8B-B14F-4D97-AF65-F5344CB8AC3E}">
-        <p14:creationId xmlns="" xmlns:p14="http://schemas.microsoft.com/office/powerpoint/2010/main" val="2489790497"/>
+        <p14:creationId xmlns:p14="http://schemas.microsoft.com/office/powerpoint/2010/main" xmlns="" val="2489790497"/>
       </p:ext>
     </p:extLst>
   </p:cSld>
@@ -3189,7 +3189,7 @@
     </p:spTree>
     <p:extLst>
       <p:ext uri="{BB962C8B-B14F-4D97-AF65-F5344CB8AC3E}">
-        <p14:creationId xmlns="" xmlns:p14="http://schemas.microsoft.com/office/powerpoint/2010/main" val="3952036634"/>
+        <p14:creationId xmlns:p14="http://schemas.microsoft.com/office/powerpoint/2010/main" xmlns="" val="3952036634"/>
       </p:ext>
     </p:extLst>
   </p:cSld>
@@ -3449,7 +3449,7 @@
     </p:spTree>
     <p:extLst>
       <p:ext uri="{BB962C8B-B14F-4D97-AF65-F5344CB8AC3E}">
-        <p14:creationId xmlns="" xmlns:p14="http://schemas.microsoft.com/office/powerpoint/2010/main" val="2962468041"/>
+        <p14:creationId xmlns:p14="http://schemas.microsoft.com/office/powerpoint/2010/main" xmlns="" val="2962468041"/>
       </p:ext>
     </p:extLst>
   </p:cSld>
@@ -3909,7 +3909,7 @@
     </p:spTree>
     <p:extLst>
       <p:ext uri="{BB962C8B-B14F-4D97-AF65-F5344CB8AC3E}">
-        <p14:creationId xmlns="" xmlns:p14="http://schemas.microsoft.com/office/powerpoint/2010/main" val="987628861"/>
+        <p14:creationId xmlns:p14="http://schemas.microsoft.com/office/powerpoint/2010/main" xmlns="" val="987628861"/>
       </p:ext>
     </p:extLst>
   </p:cSld>
@@ -3976,35 +3976,73 @@
             <p:ph idx="1"/>
           </p:nvPr>
         </p:nvSpPr>
-        <p:spPr/>
-        <p:txBody>
-          <a:bodyPr/>
+        <p:spPr>
+          <a:xfrm>
+            <a:off x="457200" y="3276600"/>
+            <a:ext cx="8229600" cy="2849563"/>
+          </a:xfrm>
+        </p:spPr>
+        <p:txBody>
+          <a:bodyPr>
+            <a:normAutofit/>
+          </a:bodyPr>
           <a:lstStyle/>
           <a:p>
             <a:pPr>
               <a:buNone/>
             </a:pPr>
             <a:r>
-              <a:rPr lang="en-US" dirty="0" smtClean="0">
-                <a:solidFill>
-                  <a:srgbClr val="FF0000"/>
-                </a:solidFill>
-              </a:rPr>
-              <a:t>&lt;CHART&gt; - Panel size Vs yearly costs</a:t>
-            </a:r>
-          </a:p>
-          <a:p>
-            <a:pPr>
-              <a:buNone/>
-            </a:pPr>
-            <a:r>
               <a:rPr lang="en-US" dirty="0" smtClean="0"/>
-              <a:t>For the typical (suburban) New York family, a PV system consisting of 25 panels will be needed to virtually offset monthly/yearly electricity costs.</a:t>
+              <a:t>For </a:t>
+            </a:r>
+            <a:r>
+              <a:rPr lang="en-US" dirty="0" smtClean="0"/>
+              <a:t>the typical (suburban) New York family, a PV system consisting of </a:t>
+            </a:r>
+            <a:r>
+              <a:rPr lang="en-US" dirty="0" smtClean="0"/>
+              <a:t>30 </a:t>
+            </a:r>
+            <a:r>
+              <a:rPr lang="en-US" dirty="0" smtClean="0"/>
+              <a:t>panels will be needed to virtually offset monthly/yearly electricity costs.</a:t>
             </a:r>
             <a:endParaRPr lang="en-US" dirty="0"/>
           </a:p>
         </p:txBody>
       </p:sp>
+      <p:pic>
+        <p:nvPicPr>
+          <p:cNvPr id="1027" name="Picture 3"/>
+          <p:cNvPicPr>
+            <a:picLocks noChangeAspect="1" noChangeArrowheads="1"/>
+          </p:cNvPicPr>
+          <p:nvPr/>
+        </p:nvPicPr>
+        <p:blipFill>
+          <a:blip r:embed="rId2" cstate="print"/>
+          <a:srcRect/>
+          <a:stretch>
+            <a:fillRect/>
+          </a:stretch>
+        </p:blipFill>
+        <p:spPr bwMode="auto">
+          <a:xfrm>
+            <a:off x="2286000" y="1676400"/>
+            <a:ext cx="4286250" cy="1362075"/>
+          </a:xfrm>
+          <a:prstGeom prst="rect">
+            <a:avLst/>
+          </a:prstGeom>
+          <a:noFill/>
+          <a:ln w="9525">
+            <a:noFill/>
+            <a:miter lim="800000"/>
+            <a:headEnd/>
+            <a:tailEnd/>
+          </a:ln>
+        </p:spPr>
+      </p:pic>
     </p:spTree>
   </p:cSld>
   <p:clrMapOvr>

</xml_diff>